<commit_message>
add kibana, elasticsearch, change cassandra and zeppelin
</commit_message>
<xml_diff>
--- a/spark-climateanalysis/doc/Picture of Platforms and Skills used in Solution.pptx
+++ b/spark-climateanalysis/doc/Picture of Platforms and Skills used in Solution.pptx
@@ -104,7 +104,16 @@
       </a:defRPr>
     </a:lvl9pPr>
   </p:defaultTextStyle>
+  <p:extLst>
+    <p:ext uri="{EFAFB233-063F-42B5-8137-9DF3F51BA10A}">
+      <p15:sldGuideLst xmlns:p15="http://schemas.microsoft.com/office/powerpoint/2012/main"/>
+    </p:ext>
+  </p:extLst>
 </p:presentation>
+</file>
+
+<file path=ppt/revisionInfo.xml><?xml version="1.0" encoding="utf-8"?>
+<p1510:revInfo xmlns:a="http://schemas.openxmlformats.org/drawingml/2006/main" xmlns:r="http://schemas.openxmlformats.org/officeDocument/2006/relationships" xmlns:p1510="http://schemas.microsoft.com/office/powerpoint/2015/10/main"/>
 </file>
 
 <file path=ppt/slideLayouts/slideLayout1.xml><?xml version="1.0" encoding="utf-8"?>
@@ -256,7 +265,7 @@
           <a:p>
             <a:fld id="{D9476439-35B1-47F4-8B0B-BC129469BBD8}" type="datetimeFigureOut">
               <a:rPr lang="en-CA" smtClean="0"/>
-              <a:t>2017-06-20</a:t>
+              <a:t>2017-06-22</a:t>
             </a:fld>
             <a:endParaRPr lang="en-CA"/>
           </a:p>
@@ -456,7 +465,7 @@
           <a:p>
             <a:fld id="{D9476439-35B1-47F4-8B0B-BC129469BBD8}" type="datetimeFigureOut">
               <a:rPr lang="en-CA" smtClean="0"/>
-              <a:t>2017-06-20</a:t>
+              <a:t>2017-06-22</a:t>
             </a:fld>
             <a:endParaRPr lang="en-CA"/>
           </a:p>
@@ -666,7 +675,7 @@
           <a:p>
             <a:fld id="{D9476439-35B1-47F4-8B0B-BC129469BBD8}" type="datetimeFigureOut">
               <a:rPr lang="en-CA" smtClean="0"/>
-              <a:t>2017-06-20</a:t>
+              <a:t>2017-06-22</a:t>
             </a:fld>
             <a:endParaRPr lang="en-CA"/>
           </a:p>
@@ -866,7 +875,7 @@
           <a:p>
             <a:fld id="{D9476439-35B1-47F4-8B0B-BC129469BBD8}" type="datetimeFigureOut">
               <a:rPr lang="en-CA" smtClean="0"/>
-              <a:t>2017-06-20</a:t>
+              <a:t>2017-06-22</a:t>
             </a:fld>
             <a:endParaRPr lang="en-CA"/>
           </a:p>
@@ -1142,7 +1151,7 @@
           <a:p>
             <a:fld id="{D9476439-35B1-47F4-8B0B-BC129469BBD8}" type="datetimeFigureOut">
               <a:rPr lang="en-CA" smtClean="0"/>
-              <a:t>2017-06-20</a:t>
+              <a:t>2017-06-22</a:t>
             </a:fld>
             <a:endParaRPr lang="en-CA"/>
           </a:p>
@@ -1410,7 +1419,7 @@
           <a:p>
             <a:fld id="{D9476439-35B1-47F4-8B0B-BC129469BBD8}" type="datetimeFigureOut">
               <a:rPr lang="en-CA" smtClean="0"/>
-              <a:t>2017-06-20</a:t>
+              <a:t>2017-06-22</a:t>
             </a:fld>
             <a:endParaRPr lang="en-CA"/>
           </a:p>
@@ -1825,7 +1834,7 @@
           <a:p>
             <a:fld id="{D9476439-35B1-47F4-8B0B-BC129469BBD8}" type="datetimeFigureOut">
               <a:rPr lang="en-CA" smtClean="0"/>
-              <a:t>2017-06-20</a:t>
+              <a:t>2017-06-22</a:t>
             </a:fld>
             <a:endParaRPr lang="en-CA"/>
           </a:p>
@@ -1967,7 +1976,7 @@
           <a:p>
             <a:fld id="{D9476439-35B1-47F4-8B0B-BC129469BBD8}" type="datetimeFigureOut">
               <a:rPr lang="en-CA" smtClean="0"/>
-              <a:t>2017-06-20</a:t>
+              <a:t>2017-06-22</a:t>
             </a:fld>
             <a:endParaRPr lang="en-CA"/>
           </a:p>
@@ -2080,7 +2089,7 @@
           <a:p>
             <a:fld id="{D9476439-35B1-47F4-8B0B-BC129469BBD8}" type="datetimeFigureOut">
               <a:rPr lang="en-CA" smtClean="0"/>
-              <a:t>2017-06-20</a:t>
+              <a:t>2017-06-22</a:t>
             </a:fld>
             <a:endParaRPr lang="en-CA"/>
           </a:p>
@@ -2393,7 +2402,7 @@
           <a:p>
             <a:fld id="{D9476439-35B1-47F4-8B0B-BC129469BBD8}" type="datetimeFigureOut">
               <a:rPr lang="en-CA" smtClean="0"/>
-              <a:t>2017-06-20</a:t>
+              <a:t>2017-06-22</a:t>
             </a:fld>
             <a:endParaRPr lang="en-CA"/>
           </a:p>
@@ -2682,7 +2691,7 @@
           <a:p>
             <a:fld id="{D9476439-35B1-47F4-8B0B-BC129469BBD8}" type="datetimeFigureOut">
               <a:rPr lang="en-CA" smtClean="0"/>
-              <a:t>2017-06-20</a:t>
+              <a:t>2017-06-22</a:t>
             </a:fld>
             <a:endParaRPr lang="en-CA"/>
           </a:p>
@@ -2925,7 +2934,7 @@
           <a:p>
             <a:fld id="{D9476439-35B1-47F4-8B0B-BC129469BBD8}" type="datetimeFigureOut">
               <a:rPr lang="en-CA" smtClean="0"/>
-              <a:t>2017-06-20</a:t>
+              <a:t>2017-06-22</a:t>
             </a:fld>
             <a:endParaRPr lang="en-CA"/>
           </a:p>
@@ -3342,39 +3351,6 @@
           <a:chExt cx="0" cy="0"/>
         </a:xfrm>
       </p:grpSpPr>
-      <p:sp>
-        <p:nvSpPr>
-          <p:cNvPr id="3" name="Title 2"/>
-          <p:cNvSpPr>
-            <a:spLocks noGrp="1"/>
-          </p:cNvSpPr>
-          <p:nvPr>
-            <p:ph type="title"/>
-          </p:nvPr>
-        </p:nvSpPr>
-        <p:spPr>
-          <a:xfrm>
-            <a:off x="2238891" y="447322"/>
-            <a:ext cx="7178305" cy="840113"/>
-          </a:xfrm>
-        </p:spPr>
-        <p:txBody>
-          <a:bodyPr>
-            <a:normAutofit/>
-          </a:bodyPr>
-          <a:lstStyle/>
-          <a:p>
-            <a:r>
-              <a:rPr lang="en-CA" b="1" dirty="0">
-                <a:solidFill>
-                  <a:srgbClr val="0070C0"/>
-                </a:solidFill>
-              </a:rPr>
-              <a:t>Platform/Framework Picture</a:t>
-            </a:r>
-          </a:p>
-        </p:txBody>
-      </p:sp>
       <p:pic>
         <p:nvPicPr>
           <p:cNvPr id="9" name="Picture 8" descr="apache nifi is an easy to use powerful and reliable system to process ..."/>
@@ -3427,7 +3403,7 @@
         </p:blipFill>
         <p:spPr>
           <a:xfrm>
-            <a:off x="4227843" y="1591461"/>
+            <a:off x="3720599" y="672229"/>
             <a:ext cx="1600200" cy="895350"/>
           </a:xfrm>
           <a:prstGeom prst="rect">
@@ -3547,7 +3523,7 @@
         </p:blipFill>
         <p:spPr>
           <a:xfrm>
-            <a:off x="629576" y="1742933"/>
+            <a:off x="555134" y="1061734"/>
             <a:ext cx="2212492" cy="649556"/>
           </a:xfrm>
           <a:prstGeom prst="rect">
@@ -3577,7 +3553,7 @@
         </p:blipFill>
         <p:spPr>
           <a:xfrm>
-            <a:off x="4520699" y="2979357"/>
+            <a:off x="4591489" y="2242274"/>
             <a:ext cx="1933575" cy="940490"/>
           </a:xfrm>
           <a:prstGeom prst="rect">
@@ -3613,7 +3589,7 @@
         </p:blipFill>
         <p:spPr>
           <a:xfrm>
-            <a:off x="6650727" y="1788433"/>
+            <a:off x="5440682" y="280064"/>
             <a:ext cx="2511907" cy="978084"/>
           </a:xfrm>
           <a:prstGeom prst="rect">
@@ -3649,7 +3625,7 @@
         </p:blipFill>
         <p:spPr>
           <a:xfrm>
-            <a:off x="1817615" y="5605032"/>
+            <a:off x="1390116" y="5671708"/>
             <a:ext cx="1914525" cy="914402"/>
           </a:xfrm>
           <a:prstGeom prst="rect">
@@ -3757,7 +3733,7 @@
         </p:blipFill>
         <p:spPr>
           <a:xfrm>
-            <a:off x="4227843" y="4381702"/>
+            <a:off x="4280425" y="3904670"/>
             <a:ext cx="2539682" cy="825397"/>
           </a:xfrm>
           <a:prstGeom prst="rect">
@@ -3829,7 +3805,7 @@
         </p:blipFill>
         <p:spPr>
           <a:xfrm>
-            <a:off x="2152789" y="2543961"/>
+            <a:off x="1855459" y="2300117"/>
             <a:ext cx="2009465" cy="930538"/>
           </a:xfrm>
           <a:prstGeom prst="rect">
@@ -3939,6 +3915,114 @@
           <a:xfrm>
             <a:off x="7269438" y="4857750"/>
             <a:ext cx="1288775" cy="465690"/>
+          </a:xfrm>
+          <a:prstGeom prst="rect">
+            <a:avLst/>
+          </a:prstGeom>
+        </p:spPr>
+      </p:pic>
+      <p:pic>
+        <p:nvPicPr>
+          <p:cNvPr id="5" name="Picture 4">
+            <a:extLst>
+              <a:ext uri="{FF2B5EF4-FFF2-40B4-BE49-F238E27FC236}">
+                <a16:creationId xmlns:a16="http://schemas.microsoft.com/office/drawing/2014/main" id="{F94B5690-5752-4B7C-A19C-180BC18CFC2D}"/>
+              </a:ext>
+            </a:extLst>
+          </p:cNvPr>
+          <p:cNvPicPr>
+            <a:picLocks noChangeAspect="1"/>
+          </p:cNvPicPr>
+          <p:nvPr/>
+        </p:nvPicPr>
+        <p:blipFill>
+          <a:blip r:embed="rId12">
+            <a:extLst>
+              <a:ext uri="{28A0092B-C50C-407E-A947-70E740481C1C}">
+                <a14:useLocalDpi xmlns:a14="http://schemas.microsoft.com/office/drawing/2010/main" val="0"/>
+              </a:ext>
+            </a:extLst>
+          </a:blip>
+          <a:stretch>
+            <a:fillRect/>
+          </a:stretch>
+        </p:blipFill>
+        <p:spPr>
+          <a:xfrm>
+            <a:off x="3157521" y="5299349"/>
+            <a:ext cx="1659228" cy="502533"/>
+          </a:xfrm>
+          <a:prstGeom prst="rect">
+            <a:avLst/>
+          </a:prstGeom>
+        </p:spPr>
+      </p:pic>
+      <p:pic>
+        <p:nvPicPr>
+          <p:cNvPr id="11" name="Picture 10">
+            <a:extLst>
+              <a:ext uri="{FF2B5EF4-FFF2-40B4-BE49-F238E27FC236}">
+                <a16:creationId xmlns:a16="http://schemas.microsoft.com/office/drawing/2014/main" id="{B706C5BB-7B7A-44AA-B35E-7EDD5DE32E7B}"/>
+              </a:ext>
+            </a:extLst>
+          </p:cNvPr>
+          <p:cNvPicPr>
+            <a:picLocks noChangeAspect="1"/>
+          </p:cNvPicPr>
+          <p:nvPr/>
+        </p:nvPicPr>
+        <p:blipFill>
+          <a:blip r:embed="rId19">
+            <a:extLst>
+              <a:ext uri="{28A0092B-C50C-407E-A947-70E740481C1C}">
+                <a14:useLocalDpi xmlns:a14="http://schemas.microsoft.com/office/drawing/2010/main" val="0"/>
+              </a:ext>
+            </a:extLst>
+          </a:blip>
+          <a:stretch>
+            <a:fillRect/>
+          </a:stretch>
+        </p:blipFill>
+        <p:spPr>
+          <a:xfrm>
+            <a:off x="8034440" y="274302"/>
+            <a:ext cx="3046138" cy="913013"/>
+          </a:xfrm>
+          <a:prstGeom prst="rect">
+            <a:avLst/>
+          </a:prstGeom>
+        </p:spPr>
+      </p:pic>
+      <p:pic>
+        <p:nvPicPr>
+          <p:cNvPr id="13" name="Picture 12">
+            <a:extLst>
+              <a:ext uri="{FF2B5EF4-FFF2-40B4-BE49-F238E27FC236}">
+                <a16:creationId xmlns:a16="http://schemas.microsoft.com/office/drawing/2014/main" id="{4C8DC01B-4491-4CCA-9258-F2DCFDCE7905}"/>
+              </a:ext>
+            </a:extLst>
+          </p:cNvPr>
+          <p:cNvPicPr>
+            <a:picLocks noChangeAspect="1"/>
+          </p:cNvPicPr>
+          <p:nvPr/>
+        </p:nvPicPr>
+        <p:blipFill>
+          <a:blip r:embed="rId20">
+            <a:extLst>
+              <a:ext uri="{28A0092B-C50C-407E-A947-70E740481C1C}">
+                <a14:useLocalDpi xmlns:a14="http://schemas.microsoft.com/office/drawing/2010/main" val="0"/>
+              </a:ext>
+            </a:extLst>
+          </a:blip>
+          <a:stretch>
+            <a:fillRect/>
+          </a:stretch>
+        </p:blipFill>
+        <p:spPr>
+          <a:xfrm>
+            <a:off x="7408004" y="1359277"/>
+            <a:ext cx="1697731" cy="1442967"/>
           </a:xfrm>
           <a:prstGeom prst="rect">
             <a:avLst/>

</xml_diff>

<commit_message>
add HBase to Spark ETL
</commit_message>
<xml_diff>
--- a/spark-climateanalysis/doc/Picture of Platforms and Skills used in Solution.pptx
+++ b/spark-climateanalysis/doc/Picture of Platforms and Skills used in Solution.pptx
@@ -265,7 +265,7 @@
           <a:p>
             <a:fld id="{D9476439-35B1-47F4-8B0B-BC129469BBD8}" type="datetimeFigureOut">
               <a:rPr lang="en-CA" smtClean="0"/>
-              <a:t>2017-06-22</a:t>
+              <a:t>2017-06-26</a:t>
             </a:fld>
             <a:endParaRPr lang="en-CA"/>
           </a:p>
@@ -465,7 +465,7 @@
           <a:p>
             <a:fld id="{D9476439-35B1-47F4-8B0B-BC129469BBD8}" type="datetimeFigureOut">
               <a:rPr lang="en-CA" smtClean="0"/>
-              <a:t>2017-06-22</a:t>
+              <a:t>2017-06-26</a:t>
             </a:fld>
             <a:endParaRPr lang="en-CA"/>
           </a:p>
@@ -675,7 +675,7 @@
           <a:p>
             <a:fld id="{D9476439-35B1-47F4-8B0B-BC129469BBD8}" type="datetimeFigureOut">
               <a:rPr lang="en-CA" smtClean="0"/>
-              <a:t>2017-06-22</a:t>
+              <a:t>2017-06-26</a:t>
             </a:fld>
             <a:endParaRPr lang="en-CA"/>
           </a:p>
@@ -875,7 +875,7 @@
           <a:p>
             <a:fld id="{D9476439-35B1-47F4-8B0B-BC129469BBD8}" type="datetimeFigureOut">
               <a:rPr lang="en-CA" smtClean="0"/>
-              <a:t>2017-06-22</a:t>
+              <a:t>2017-06-26</a:t>
             </a:fld>
             <a:endParaRPr lang="en-CA"/>
           </a:p>
@@ -1151,7 +1151,7 @@
           <a:p>
             <a:fld id="{D9476439-35B1-47F4-8B0B-BC129469BBD8}" type="datetimeFigureOut">
               <a:rPr lang="en-CA" smtClean="0"/>
-              <a:t>2017-06-22</a:t>
+              <a:t>2017-06-26</a:t>
             </a:fld>
             <a:endParaRPr lang="en-CA"/>
           </a:p>
@@ -1419,7 +1419,7 @@
           <a:p>
             <a:fld id="{D9476439-35B1-47F4-8B0B-BC129469BBD8}" type="datetimeFigureOut">
               <a:rPr lang="en-CA" smtClean="0"/>
-              <a:t>2017-06-22</a:t>
+              <a:t>2017-06-26</a:t>
             </a:fld>
             <a:endParaRPr lang="en-CA"/>
           </a:p>
@@ -1834,7 +1834,7 @@
           <a:p>
             <a:fld id="{D9476439-35B1-47F4-8B0B-BC129469BBD8}" type="datetimeFigureOut">
               <a:rPr lang="en-CA" smtClean="0"/>
-              <a:t>2017-06-22</a:t>
+              <a:t>2017-06-26</a:t>
             </a:fld>
             <a:endParaRPr lang="en-CA"/>
           </a:p>
@@ -1976,7 +1976,7 @@
           <a:p>
             <a:fld id="{D9476439-35B1-47F4-8B0B-BC129469BBD8}" type="datetimeFigureOut">
               <a:rPr lang="en-CA" smtClean="0"/>
-              <a:t>2017-06-22</a:t>
+              <a:t>2017-06-26</a:t>
             </a:fld>
             <a:endParaRPr lang="en-CA"/>
           </a:p>
@@ -2089,7 +2089,7 @@
           <a:p>
             <a:fld id="{D9476439-35B1-47F4-8B0B-BC129469BBD8}" type="datetimeFigureOut">
               <a:rPr lang="en-CA" smtClean="0"/>
-              <a:t>2017-06-22</a:t>
+              <a:t>2017-06-26</a:t>
             </a:fld>
             <a:endParaRPr lang="en-CA"/>
           </a:p>
@@ -2402,7 +2402,7 @@
           <a:p>
             <a:fld id="{D9476439-35B1-47F4-8B0B-BC129469BBD8}" type="datetimeFigureOut">
               <a:rPr lang="en-CA" smtClean="0"/>
-              <a:t>2017-06-22</a:t>
+              <a:t>2017-06-26</a:t>
             </a:fld>
             <a:endParaRPr lang="en-CA"/>
           </a:p>
@@ -2691,7 +2691,7 @@
           <a:p>
             <a:fld id="{D9476439-35B1-47F4-8B0B-BC129469BBD8}" type="datetimeFigureOut">
               <a:rPr lang="en-CA" smtClean="0"/>
-              <a:t>2017-06-22</a:t>
+              <a:t>2017-06-26</a:t>
             </a:fld>
             <a:endParaRPr lang="en-CA"/>
           </a:p>
@@ -2934,7 +2934,7 @@
           <a:p>
             <a:fld id="{D9476439-35B1-47F4-8B0B-BC129469BBD8}" type="datetimeFigureOut">
               <a:rPr lang="en-CA" smtClean="0"/>
-              <a:t>2017-06-22</a:t>
+              <a:t>2017-06-26</a:t>
             </a:fld>
             <a:endParaRPr lang="en-CA"/>
           </a:p>
@@ -3493,7 +3493,7 @@
         </p:blipFill>
         <p:spPr>
           <a:xfrm>
-            <a:off x="8131865" y="5500136"/>
+            <a:off x="7729952" y="5724144"/>
             <a:ext cx="1656522" cy="827848"/>
           </a:xfrm>
           <a:prstGeom prst="rect">
@@ -3987,6 +3987,78 @@
           <a:xfrm>
             <a:off x="7408004" y="1359277"/>
             <a:ext cx="1697731" cy="1442967"/>
+          </a:xfrm>
+          <a:prstGeom prst="rect">
+            <a:avLst/>
+          </a:prstGeom>
+        </p:spPr>
+      </p:pic>
+      <p:pic>
+        <p:nvPicPr>
+          <p:cNvPr id="3" name="Picture 2">
+            <a:extLst>
+              <a:ext uri="{FF2B5EF4-FFF2-40B4-BE49-F238E27FC236}">
+                <a16:creationId xmlns:a16="http://schemas.microsoft.com/office/drawing/2014/main" id="{0F165186-238F-40BB-B74F-77F82BB5D96A}"/>
+              </a:ext>
+            </a:extLst>
+          </p:cNvPr>
+          <p:cNvPicPr>
+            <a:picLocks noChangeAspect="1"/>
+          </p:cNvPicPr>
+          <p:nvPr/>
+        </p:nvPicPr>
+        <p:blipFill>
+          <a:blip r:embed="rId21">
+            <a:extLst>
+              <a:ext uri="{28A0092B-C50C-407E-A947-70E740481C1C}">
+                <a14:useLocalDpi xmlns:a14="http://schemas.microsoft.com/office/drawing/2010/main" val="0"/>
+              </a:ext>
+            </a:extLst>
+          </a:blip>
+          <a:stretch>
+            <a:fillRect/>
+          </a:stretch>
+        </p:blipFill>
+        <p:spPr>
+          <a:xfrm>
+            <a:off x="10030516" y="5876641"/>
+            <a:ext cx="1623016" cy="532223"/>
+          </a:xfrm>
+          <a:prstGeom prst="rect">
+            <a:avLst/>
+          </a:prstGeom>
+        </p:spPr>
+      </p:pic>
+      <p:pic>
+        <p:nvPicPr>
+          <p:cNvPr id="7" name="Picture 6">
+            <a:extLst>
+              <a:ext uri="{FF2B5EF4-FFF2-40B4-BE49-F238E27FC236}">
+                <a16:creationId xmlns:a16="http://schemas.microsoft.com/office/drawing/2014/main" id="{6E0DF3BA-4707-4409-A883-0E0A2DF54D75}"/>
+              </a:ext>
+            </a:extLst>
+          </p:cNvPr>
+          <p:cNvPicPr>
+            <a:picLocks noChangeAspect="1"/>
+          </p:cNvPicPr>
+          <p:nvPr/>
+        </p:nvPicPr>
+        <p:blipFill>
+          <a:blip r:embed="rId22">
+            <a:extLst>
+              <a:ext uri="{28A0092B-C50C-407E-A947-70E740481C1C}">
+                <a14:useLocalDpi xmlns:a14="http://schemas.microsoft.com/office/drawing/2010/main" val="0"/>
+              </a:ext>
+            </a:extLst>
+          </a:blip>
+          <a:stretch>
+            <a:fillRect/>
+          </a:stretch>
+        </p:blipFill>
+        <p:spPr>
+          <a:xfrm>
+            <a:off x="136183" y="4478684"/>
+            <a:ext cx="1600200" cy="547474"/>
           </a:xfrm>
           <a:prstGeom prst="rect">
             <a:avLst/>

</xml_diff>

<commit_message>
add redis ml model serving layer
</commit_message>
<xml_diff>
--- a/spark-climateanalysis/doc/Picture of Platforms and Skills used in Solution.pptx
+++ b/spark-climateanalysis/doc/Picture of Platforms and Skills used in Solution.pptx
@@ -265,7 +265,7 @@
           <a:p>
             <a:fld id="{D9476439-35B1-47F4-8B0B-BC129469BBD8}" type="datetimeFigureOut">
               <a:rPr lang="en-CA" smtClean="0"/>
-              <a:t>2017-06-26</a:t>
+              <a:t>2017-07-19</a:t>
             </a:fld>
             <a:endParaRPr lang="en-CA"/>
           </a:p>
@@ -465,7 +465,7 @@
           <a:p>
             <a:fld id="{D9476439-35B1-47F4-8B0B-BC129469BBD8}" type="datetimeFigureOut">
               <a:rPr lang="en-CA" smtClean="0"/>
-              <a:t>2017-06-26</a:t>
+              <a:t>2017-07-19</a:t>
             </a:fld>
             <a:endParaRPr lang="en-CA"/>
           </a:p>
@@ -675,7 +675,7 @@
           <a:p>
             <a:fld id="{D9476439-35B1-47F4-8B0B-BC129469BBD8}" type="datetimeFigureOut">
               <a:rPr lang="en-CA" smtClean="0"/>
-              <a:t>2017-06-26</a:t>
+              <a:t>2017-07-19</a:t>
             </a:fld>
             <a:endParaRPr lang="en-CA"/>
           </a:p>
@@ -875,7 +875,7 @@
           <a:p>
             <a:fld id="{D9476439-35B1-47F4-8B0B-BC129469BBD8}" type="datetimeFigureOut">
               <a:rPr lang="en-CA" smtClean="0"/>
-              <a:t>2017-06-26</a:t>
+              <a:t>2017-07-19</a:t>
             </a:fld>
             <a:endParaRPr lang="en-CA"/>
           </a:p>
@@ -1151,7 +1151,7 @@
           <a:p>
             <a:fld id="{D9476439-35B1-47F4-8B0B-BC129469BBD8}" type="datetimeFigureOut">
               <a:rPr lang="en-CA" smtClean="0"/>
-              <a:t>2017-06-26</a:t>
+              <a:t>2017-07-19</a:t>
             </a:fld>
             <a:endParaRPr lang="en-CA"/>
           </a:p>
@@ -1419,7 +1419,7 @@
           <a:p>
             <a:fld id="{D9476439-35B1-47F4-8B0B-BC129469BBD8}" type="datetimeFigureOut">
               <a:rPr lang="en-CA" smtClean="0"/>
-              <a:t>2017-06-26</a:t>
+              <a:t>2017-07-19</a:t>
             </a:fld>
             <a:endParaRPr lang="en-CA"/>
           </a:p>
@@ -1834,7 +1834,7 @@
           <a:p>
             <a:fld id="{D9476439-35B1-47F4-8B0B-BC129469BBD8}" type="datetimeFigureOut">
               <a:rPr lang="en-CA" smtClean="0"/>
-              <a:t>2017-06-26</a:t>
+              <a:t>2017-07-19</a:t>
             </a:fld>
             <a:endParaRPr lang="en-CA"/>
           </a:p>
@@ -1976,7 +1976,7 @@
           <a:p>
             <a:fld id="{D9476439-35B1-47F4-8B0B-BC129469BBD8}" type="datetimeFigureOut">
               <a:rPr lang="en-CA" smtClean="0"/>
-              <a:t>2017-06-26</a:t>
+              <a:t>2017-07-19</a:t>
             </a:fld>
             <a:endParaRPr lang="en-CA"/>
           </a:p>
@@ -2089,7 +2089,7 @@
           <a:p>
             <a:fld id="{D9476439-35B1-47F4-8B0B-BC129469BBD8}" type="datetimeFigureOut">
               <a:rPr lang="en-CA" smtClean="0"/>
-              <a:t>2017-06-26</a:t>
+              <a:t>2017-07-19</a:t>
             </a:fld>
             <a:endParaRPr lang="en-CA"/>
           </a:p>
@@ -2402,7 +2402,7 @@
           <a:p>
             <a:fld id="{D9476439-35B1-47F4-8B0B-BC129469BBD8}" type="datetimeFigureOut">
               <a:rPr lang="en-CA" smtClean="0"/>
-              <a:t>2017-06-26</a:t>
+              <a:t>2017-07-19</a:t>
             </a:fld>
             <a:endParaRPr lang="en-CA"/>
           </a:p>
@@ -2691,7 +2691,7 @@
           <a:p>
             <a:fld id="{D9476439-35B1-47F4-8B0B-BC129469BBD8}" type="datetimeFigureOut">
               <a:rPr lang="en-CA" smtClean="0"/>
-              <a:t>2017-06-26</a:t>
+              <a:t>2017-07-19</a:t>
             </a:fld>
             <a:endParaRPr lang="en-CA"/>
           </a:p>
@@ -2934,7 +2934,7 @@
           <a:p>
             <a:fld id="{D9476439-35B1-47F4-8B0B-BC129469BBD8}" type="datetimeFigureOut">
               <a:rPr lang="en-CA" smtClean="0"/>
-              <a:t>2017-06-26</a:t>
+              <a:t>2017-07-19</a:t>
             </a:fld>
             <a:endParaRPr lang="en-CA"/>
           </a:p>
@@ -3433,7 +3433,7 @@
         </p:blipFill>
         <p:spPr>
           <a:xfrm>
-            <a:off x="1432995" y="3659066"/>
+            <a:off x="1500151" y="3549428"/>
             <a:ext cx="1918045" cy="978574"/>
           </a:xfrm>
           <a:prstGeom prst="rect">
@@ -3697,7 +3697,7 @@
         </p:blipFill>
         <p:spPr>
           <a:xfrm>
-            <a:off x="2459174" y="5105944"/>
+            <a:off x="2951257" y="4875689"/>
             <a:ext cx="1930076" cy="692057"/>
           </a:xfrm>
           <a:prstGeom prst="rect">
@@ -3877,7 +3877,7 @@
         </p:blipFill>
         <p:spPr>
           <a:xfrm>
-            <a:off x="294758" y="2802244"/>
+            <a:off x="335039" y="2135958"/>
             <a:ext cx="1138237" cy="906435"/>
           </a:xfrm>
           <a:prstGeom prst="rect">
@@ -4065,6 +4065,177 @@
           </a:prstGeom>
         </p:spPr>
       </p:pic>
+      <p:pic>
+        <p:nvPicPr>
+          <p:cNvPr id="5" name="Picture 4">
+            <a:extLst>
+              <a:ext uri="{FF2B5EF4-FFF2-40B4-BE49-F238E27FC236}">
+                <a16:creationId xmlns:a16="http://schemas.microsoft.com/office/drawing/2014/main" id="{DA4AFDA2-4FE1-47A7-95B7-814B960FAE8E}"/>
+              </a:ext>
+            </a:extLst>
+          </p:cNvPr>
+          <p:cNvPicPr>
+            <a:picLocks noChangeAspect="1"/>
+          </p:cNvPicPr>
+          <p:nvPr/>
+        </p:nvPicPr>
+        <p:blipFill>
+          <a:blip r:embed="rId23">
+            <a:extLst>
+              <a:ext uri="{28A0092B-C50C-407E-A947-70E740481C1C}">
+                <a14:useLocalDpi xmlns:a14="http://schemas.microsoft.com/office/drawing/2010/main" val="0"/>
+              </a:ext>
+            </a:extLst>
+          </a:blip>
+          <a:stretch>
+            <a:fillRect/>
+          </a:stretch>
+        </p:blipFill>
+        <p:spPr>
+          <a:xfrm>
+            <a:off x="3256863" y="6027414"/>
+            <a:ext cx="1318864" cy="577942"/>
+          </a:xfrm>
+          <a:prstGeom prst="rect">
+            <a:avLst/>
+          </a:prstGeom>
+        </p:spPr>
+      </p:pic>
+      <p:sp>
+        <p:nvSpPr>
+          <p:cNvPr id="14" name="TextBox 13">
+            <a:extLst>
+              <a:ext uri="{FF2B5EF4-FFF2-40B4-BE49-F238E27FC236}">
+                <a16:creationId xmlns:a16="http://schemas.microsoft.com/office/drawing/2014/main" id="{6A5547C4-C136-445C-ACCB-3345F910E0E2}"/>
+              </a:ext>
+            </a:extLst>
+          </p:cNvPr>
+          <p:cNvSpPr txBox="1"/>
+          <p:nvPr/>
+        </p:nvSpPr>
+        <p:spPr>
+          <a:xfrm>
+            <a:off x="3574627" y="4666457"/>
+            <a:ext cx="1658998" cy="369332"/>
+          </a:xfrm>
+          <a:prstGeom prst="rect">
+            <a:avLst/>
+          </a:prstGeom>
+          <a:noFill/>
+        </p:spPr>
+        <p:txBody>
+          <a:bodyPr wrap="square" rtlCol="0">
+            <a:spAutoFit/>
+          </a:bodyPr>
+          <a:lstStyle/>
+          <a:p>
+            <a:r>
+              <a:rPr lang="en-CA" sz="900">
+                <a:hlinkClick r:id="rId24" tooltip="https://en.wikipedia.org/wiki/Predictive_Model_Markup_Language"/>
+              </a:rPr>
+              <a:t>This Photo</a:t>
+            </a:r>
+            <a:r>
+              <a:rPr lang="en-CA" sz="900"/>
+              <a:t> by Unknown Author is licensed under </a:t>
+            </a:r>
+            <a:r>
+              <a:rPr lang="en-CA" sz="900">
+                <a:hlinkClick r:id="rId25" tooltip="https://creativecommons.org/licenses/by-sa/3.0/"/>
+              </a:rPr>
+              <a:t>CC BY-SA</a:t>
+            </a:r>
+            <a:endParaRPr lang="en-CA" sz="900"/>
+          </a:p>
+        </p:txBody>
+      </p:sp>
+      <p:pic>
+        <p:nvPicPr>
+          <p:cNvPr id="19" name="Picture 18">
+            <a:extLst>
+              <a:ext uri="{FF2B5EF4-FFF2-40B4-BE49-F238E27FC236}">
+                <a16:creationId xmlns:a16="http://schemas.microsoft.com/office/drawing/2014/main" id="{58FC94B5-E144-4A7C-B683-4AA3AA673531}"/>
+              </a:ext>
+            </a:extLst>
+          </p:cNvPr>
+          <p:cNvPicPr>
+            <a:picLocks noChangeAspect="1"/>
+          </p:cNvPicPr>
+          <p:nvPr/>
+        </p:nvPicPr>
+        <p:blipFill>
+          <a:blip r:embed="rId26">
+            <a:extLst>
+              <a:ext uri="{28A0092B-C50C-407E-A947-70E740481C1C}">
+                <a14:useLocalDpi xmlns:a14="http://schemas.microsoft.com/office/drawing/2010/main" val="0"/>
+              </a:ext>
+              <a:ext uri="{837473B0-CC2E-450A-ABE3-18F120FF3D39}">
+                <a1611:picAttrSrcUrl xmlns:a1611="http://schemas.microsoft.com/office/drawing/2016/11/main" r:id="rId24"/>
+              </a:ext>
+            </a:extLst>
+          </a:blip>
+          <a:stretch>
+            <a:fillRect/>
+          </a:stretch>
+        </p:blipFill>
+        <p:spPr>
+          <a:xfrm>
+            <a:off x="76721" y="3085694"/>
+            <a:ext cx="1347623" cy="1106658"/>
+          </a:xfrm>
+          <a:prstGeom prst="rect">
+            <a:avLst/>
+          </a:prstGeom>
+        </p:spPr>
+      </p:pic>
+      <p:sp>
+        <p:nvSpPr>
+          <p:cNvPr id="22" name="TextBox 21">
+            <a:extLst>
+              <a:ext uri="{FF2B5EF4-FFF2-40B4-BE49-F238E27FC236}">
+                <a16:creationId xmlns:a16="http://schemas.microsoft.com/office/drawing/2014/main" id="{33D585BD-8A96-45AB-9135-3863FF78602B}"/>
+              </a:ext>
+            </a:extLst>
+          </p:cNvPr>
+          <p:cNvSpPr txBox="1"/>
+          <p:nvPr/>
+        </p:nvSpPr>
+        <p:spPr>
+          <a:xfrm>
+            <a:off x="5320799" y="4152809"/>
+            <a:ext cx="1347623" cy="507831"/>
+          </a:xfrm>
+          <a:prstGeom prst="rect">
+            <a:avLst/>
+          </a:prstGeom>
+          <a:noFill/>
+        </p:spPr>
+        <p:txBody>
+          <a:bodyPr wrap="square" rtlCol="0">
+            <a:spAutoFit/>
+          </a:bodyPr>
+          <a:lstStyle/>
+          <a:p>
+            <a:r>
+              <a:rPr lang="en-CA" sz="900">
+                <a:hlinkClick r:id="rId24" tooltip="https://en.wikipedia.org/wiki/Predictive_Model_Markup_Language"/>
+              </a:rPr>
+              <a:t>This Photo</a:t>
+            </a:r>
+            <a:r>
+              <a:rPr lang="en-CA" sz="900"/>
+              <a:t> by Unknown Author is licensed under </a:t>
+            </a:r>
+            <a:r>
+              <a:rPr lang="en-CA" sz="900">
+                <a:hlinkClick r:id="rId25" tooltip="https://creativecommons.org/licenses/by-sa/3.0/"/>
+              </a:rPr>
+              <a:t>CC BY-SA</a:t>
+            </a:r>
+            <a:endParaRPr lang="en-CA" sz="900"/>
+          </a:p>
+        </p:txBody>
+      </p:sp>
     </p:spTree>
     <p:extLst>
       <p:ext uri="{BB962C8B-B14F-4D97-AF65-F5344CB8AC3E}">

</xml_diff>